<commit_message>
Update LeetCode Hot 100
</commit_message>
<xml_diff>
--- a/algorithms/_assets/LeetCode_0032_最长有效括号.pptx
+++ b/algorithms/_assets/LeetCode_0032_最长有效括号.pptx
@@ -104,6 +104,11 @@
       </a:defRPr>
     </a:lvl9pPr>
   </p:defaultTextStyle>
+  <p:extLst>
+    <p:ext uri="{EFAFB233-063F-42B5-8137-9DF3F51BA10A}">
+      <p15:sldGuideLst xmlns:p15="http://schemas.microsoft.com/office/powerpoint/2012/main"/>
+    </p:ext>
+  </p:extLst>
 </p:presentation>
 </file>
 
@@ -4289,7 +4294,7 @@
         </p:nvSpPr>
         <p:spPr>
           <a:xfrm>
-            <a:off x="6252337" y="1863443"/>
+            <a:off x="6223762" y="1863443"/>
             <a:ext cx="269626" cy="276999"/>
           </a:xfrm>
           <a:prstGeom prst="rect">
@@ -4609,7 +4614,7 @@
         </p:nvSpPr>
         <p:spPr>
           <a:xfrm>
-            <a:off x="5609212" y="3542945"/>
+            <a:off x="5533012" y="3542945"/>
             <a:ext cx="779381" cy="276999"/>
           </a:xfrm>
           <a:prstGeom prst="rect">
@@ -4649,7 +4654,7 @@
         </p:nvSpPr>
         <p:spPr>
           <a:xfrm>
-            <a:off x="3673182" y="1869819"/>
+            <a:off x="3720807" y="1869819"/>
             <a:ext cx="1119217" cy="276999"/>
           </a:xfrm>
           <a:prstGeom prst="rect">
@@ -4884,7 +4889,7 @@
         </p:nvSpPr>
         <p:spPr>
           <a:xfrm>
-            <a:off x="4539022" y="1609330"/>
+            <a:off x="4491397" y="1609330"/>
             <a:ext cx="1119217" cy="276999"/>
           </a:xfrm>
           <a:prstGeom prst="rect">

</xml_diff>